<commit_message>
modify some details about CLIP
</commit_message>
<xml_diff>
--- a/06AlgoData/04ImageTextGenerat/01CLIP.pptx
+++ b/06AlgoData/04ImageTextGenerat/01CLIP.pptx
@@ -234,7 +234,7 @@
           <a:p>
             <a:fld id="{E8CF71B8-DF2A-2E41-BE66-2E18A767DA8A}" type="datetimeFigureOut">
               <a:rPr lang="en-US" smtClean="0"/>
-              <a:t>7/3/2025</a:t>
+              <a:t>7/13/2025</a:t>
             </a:fld>
             <a:endParaRPr lang="en-US"/>
           </a:p>
@@ -411,7 +411,7 @@
           <a:p>
             <a:fld id="{0DD60A27-BF12-6744-9E93-932A0E34D8BB}" type="datetimeFigureOut">
               <a:rPr lang="en-US" smtClean="0"/>
-              <a:t>7/3/2025</a:t>
+              <a:t>7/13/2025</a:t>
             </a:fld>
             <a:endParaRPr lang="en-US"/>
           </a:p>
@@ -34354,118 +34354,258 @@
           <a:lstStyle/>
           <a:p>
             <a:r>
-              <a:rPr lang="zh-CN" altLang="en-US" sz="1800" dirty="0"/>
+              <a:rPr lang="zh-CN" altLang="en-US" dirty="0">
+                <a:solidFill>
+                  <a:srgbClr val="333333"/>
+                </a:solidFill>
+                <a:latin typeface="Helvetica Neue"/>
+              </a:rPr>
               <a:t>尽管</a:t>
             </a:r>
             <a:r>
-              <a:rPr lang="en-US" altLang="zh-CN" sz="1800" dirty="0"/>
+              <a:rPr lang="en-US" altLang="zh-CN" dirty="0">
+                <a:solidFill>
+                  <a:srgbClr val="333333"/>
+                </a:solidFill>
+                <a:latin typeface="Helvetica Neue"/>
+              </a:rPr>
               <a:t>CLIP</a:t>
             </a:r>
             <a:r>
-              <a:rPr lang="zh-CN" altLang="en-US" sz="1800" dirty="0"/>
+              <a:rPr lang="zh-CN" altLang="en-US" dirty="0">
+                <a:solidFill>
+                  <a:srgbClr val="333333"/>
+                </a:solidFill>
+                <a:latin typeface="Helvetica Neue"/>
+              </a:rPr>
               <a:t>的泛化性做的如此之好，为什么不都是用</a:t>
             </a:r>
             <a:r>
-              <a:rPr lang="en-US" altLang="zh-CN" sz="1800" dirty="0"/>
+              <a:rPr lang="en-US" altLang="zh-CN" dirty="0">
+                <a:solidFill>
+                  <a:srgbClr val="333333"/>
+                </a:solidFill>
+                <a:latin typeface="Helvetica Neue"/>
+              </a:rPr>
               <a:t>CLIP</a:t>
             </a:r>
             <a:r>
-              <a:rPr lang="zh-CN" altLang="en-US" sz="1800" dirty="0"/>
+              <a:rPr lang="zh-CN" altLang="en-US" dirty="0">
+                <a:solidFill>
+                  <a:srgbClr val="333333"/>
+                </a:solidFill>
+                <a:latin typeface="Helvetica Neue"/>
+              </a:rPr>
               <a:t>呢？</a:t>
             </a:r>
-            <a:endParaRPr lang="en-US" altLang="zh-CN" sz="1800" dirty="0"/>
+            <a:endParaRPr lang="en-US" altLang="zh-CN" dirty="0">
+              <a:solidFill>
+                <a:srgbClr val="333333"/>
+              </a:solidFill>
+              <a:latin typeface="Helvetica Neue"/>
+            </a:endParaRPr>
           </a:p>
           <a:p>
             <a:pPr marL="0" indent="0" algn="l">
               <a:buNone/>
             </a:pPr>
             <a:r>
-              <a:rPr lang="zh-CN" altLang="en-US" sz="1800" dirty="0"/>
+              <a:rPr lang="zh-CN" altLang="en-US" dirty="0">
+                <a:solidFill>
+                  <a:srgbClr val="333333"/>
+                </a:solidFill>
+                <a:latin typeface="Helvetica Neue"/>
+              </a:rPr>
               <a:t>答：</a:t>
             </a:r>
             <a:r>
-              <a:rPr lang="en-US" altLang="zh-CN" sz="1800" dirty="0"/>
+              <a:rPr lang="en-US" altLang="zh-CN" dirty="0">
+                <a:solidFill>
+                  <a:srgbClr val="333333"/>
+                </a:solidFill>
+                <a:latin typeface="Helvetica Neue"/>
+              </a:rPr>
               <a:t>CLIP </a:t>
             </a:r>
             <a:r>
-              <a:rPr lang="zh-CN" altLang="en-US" sz="1800" dirty="0"/>
+              <a:rPr lang="zh-CN" altLang="en-US" dirty="0">
+                <a:solidFill>
+                  <a:srgbClr val="333333"/>
+                </a:solidFill>
+                <a:latin typeface="Helvetica Neue"/>
+              </a:rPr>
               <a:t>的 </a:t>
             </a:r>
             <a:r>
-              <a:rPr lang="en-US" altLang="zh-CN" sz="1800" dirty="0"/>
+              <a:rPr lang="en-US" altLang="zh-CN" dirty="0">
+                <a:solidFill>
+                  <a:srgbClr val="333333"/>
+                </a:solidFill>
+                <a:latin typeface="Helvetica Neue"/>
+              </a:rPr>
               <a:t>Zero-Shot </a:t>
             </a:r>
             <a:r>
-              <a:rPr lang="zh-CN" altLang="en-US" sz="1800" dirty="0"/>
+              <a:rPr lang="zh-CN" altLang="en-US" dirty="0">
+                <a:solidFill>
+                  <a:srgbClr val="333333"/>
+                </a:solidFill>
+                <a:latin typeface="Helvetica Neue"/>
+              </a:rPr>
               <a:t>性能虽优于基线模型（如 </a:t>
             </a:r>
             <a:r>
-              <a:rPr lang="en-US" altLang="zh-CN" sz="1800" dirty="0"/>
+              <a:rPr lang="en-US" altLang="zh-CN" dirty="0">
+                <a:solidFill>
+                  <a:srgbClr val="333333"/>
+                </a:solidFill>
+                <a:latin typeface="Helvetica Neue"/>
+              </a:rPr>
               <a:t>ResNet-50</a:t>
             </a:r>
             <a:r>
-              <a:rPr lang="zh-CN" altLang="en-US" sz="1800" dirty="0"/>
+              <a:rPr lang="zh-CN" altLang="en-US" dirty="0">
+                <a:solidFill>
+                  <a:srgbClr val="333333"/>
+                </a:solidFill>
+                <a:latin typeface="Helvetica Neue"/>
+              </a:rPr>
               <a:t>），但与当时的最先进模型（如 </a:t>
             </a:r>
             <a:r>
-              <a:rPr lang="en-US" altLang="zh-CN" sz="1800" dirty="0"/>
+              <a:rPr lang="en-US" altLang="zh-CN" dirty="0">
+                <a:solidFill>
+                  <a:srgbClr val="333333"/>
+                </a:solidFill>
+                <a:latin typeface="Helvetica Neue"/>
+              </a:rPr>
               <a:t>Noisy Student</a:t>
             </a:r>
             <a:r>
-              <a:rPr lang="zh-CN" altLang="en-US" sz="1800" dirty="0"/>
+              <a:rPr lang="zh-CN" altLang="en-US" dirty="0">
+                <a:solidFill>
+                  <a:srgbClr val="333333"/>
+                </a:solidFill>
+                <a:latin typeface="Helvetica Neue"/>
+              </a:rPr>
               <a:t>、</a:t>
             </a:r>
             <a:r>
-              <a:rPr lang="en-US" altLang="zh-CN" sz="1800" dirty="0"/>
+              <a:rPr lang="en-US" altLang="zh-CN" dirty="0">
+                <a:solidFill>
+                  <a:srgbClr val="333333"/>
+                </a:solidFill>
+                <a:latin typeface="Helvetica Neue"/>
+              </a:rPr>
               <a:t>Vision Transformer</a:t>
             </a:r>
             <a:r>
-              <a:rPr lang="zh-CN" altLang="en-US" sz="1800" dirty="0"/>
+              <a:rPr lang="zh-CN" altLang="en-US" dirty="0">
+                <a:solidFill>
+                  <a:srgbClr val="333333"/>
+                </a:solidFill>
+                <a:latin typeface="Helvetica Neue"/>
+              </a:rPr>
               <a:t>）相差 </a:t>
             </a:r>
             <a:r>
-              <a:rPr lang="en-US" altLang="zh-CN" sz="1800" dirty="0"/>
+              <a:rPr lang="en-US" altLang="zh-CN" dirty="0">
+                <a:solidFill>
+                  <a:srgbClr val="333333"/>
+                </a:solidFill>
+                <a:latin typeface="Helvetica Neue"/>
+              </a:rPr>
               <a:t>10-15 </a:t>
             </a:r>
             <a:r>
-              <a:rPr lang="zh-CN" altLang="en-US" sz="1800" dirty="0"/>
+              <a:rPr lang="zh-CN" altLang="en-US" dirty="0">
+                <a:solidFill>
+                  <a:srgbClr val="333333"/>
+                </a:solidFill>
+                <a:latin typeface="Helvetica Neue"/>
+              </a:rPr>
               <a:t>个百分点。</a:t>
             </a:r>
-            <a:endParaRPr lang="en-US" altLang="zh-CN" sz="1800" dirty="0"/>
+            <a:endParaRPr lang="en-US" altLang="zh-CN" dirty="0">
+              <a:solidFill>
+                <a:srgbClr val="333333"/>
+              </a:solidFill>
+              <a:latin typeface="Helvetica Neue"/>
+            </a:endParaRPr>
           </a:p>
           <a:p>
             <a:r>
-              <a:rPr lang="en-US" altLang="zh-CN" sz="1800" dirty="0"/>
+              <a:rPr lang="en-US" altLang="zh-CN" dirty="0">
+                <a:solidFill>
+                  <a:srgbClr val="333333"/>
+                </a:solidFill>
+                <a:latin typeface="Helvetica Neue"/>
+              </a:rPr>
               <a:t>CLIP</a:t>
             </a:r>
             <a:r>
-              <a:rPr lang="zh-CN" altLang="en-US" sz="1800" dirty="0"/>
+              <a:rPr lang="zh-CN" altLang="en-US" dirty="0">
+                <a:solidFill>
+                  <a:srgbClr val="333333"/>
+                </a:solidFill>
+                <a:latin typeface="Helvetica Neue"/>
+              </a:rPr>
               <a:t>的理解能力很强，还有什么改进点呢？</a:t>
             </a:r>
-            <a:endParaRPr lang="en-US" altLang="zh-CN" sz="1800" dirty="0"/>
+            <a:endParaRPr lang="en-US" altLang="zh-CN" dirty="0">
+              <a:solidFill>
+                <a:srgbClr val="333333"/>
+              </a:solidFill>
+              <a:latin typeface="Helvetica Neue"/>
+            </a:endParaRPr>
           </a:p>
           <a:p>
             <a:pPr marL="0" indent="0">
               <a:buNone/>
             </a:pPr>
             <a:r>
-              <a:rPr lang="zh-CN" altLang="en-US" sz="1800" dirty="0"/>
+              <a:rPr lang="zh-CN" altLang="en-US" dirty="0">
+                <a:solidFill>
+                  <a:srgbClr val="333333"/>
+                </a:solidFill>
+                <a:latin typeface="Helvetica Neue"/>
+              </a:rPr>
               <a:t>答：</a:t>
             </a:r>
             <a:r>
-              <a:rPr lang="en-US" altLang="zh-CN" sz="1800" dirty="0"/>
+              <a:rPr lang="en-US" altLang="zh-CN" dirty="0">
+                <a:solidFill>
+                  <a:srgbClr val="333333"/>
+                </a:solidFill>
+                <a:latin typeface="Helvetica Neue"/>
+              </a:rPr>
               <a:t>CLIP </a:t>
             </a:r>
             <a:r>
-              <a:rPr lang="zh-CN" altLang="en-US" sz="1800" dirty="0"/>
+              <a:rPr lang="zh-CN" altLang="en-US" dirty="0">
+                <a:solidFill>
+                  <a:srgbClr val="333333"/>
+                </a:solidFill>
+                <a:latin typeface="Helvetica Neue"/>
+              </a:rPr>
               <a:t>仅支持从预设类别中选择匹配结果，无法生成新概念描述（如自动生成图像标题）。论文建议未来结合对比学习与生成式目标（如 </a:t>
             </a:r>
             <a:r>
-              <a:rPr lang="en-US" altLang="zh-CN" sz="1800" dirty="0"/>
+              <a:rPr lang="en-US" altLang="zh-CN" dirty="0">
+                <a:solidFill>
+                  <a:srgbClr val="333333"/>
+                </a:solidFill>
+                <a:latin typeface="Helvetica Neue"/>
+              </a:rPr>
               <a:t>GPT</a:t>
             </a:r>
             <a:r>
-              <a:rPr lang="zh-CN" altLang="en-US" sz="1800" dirty="0"/>
+              <a:rPr lang="zh-CN" altLang="en-US" dirty="0">
+                <a:solidFill>
+                  <a:srgbClr val="333333"/>
+                </a:solidFill>
+                <a:latin typeface="Helvetica Neue"/>
+              </a:rPr>
               <a:t>），提升灵活性。</a:t>
             </a:r>
           </a:p>

</xml_diff>